<commit_message>
Update spell charge balance, change error in health attribute bonus
Spell charges cap at 20.  Health attribute now gives +2 at levrel 3.  Mage attribute gives +2 charges at level 3.
</commit_message>
<xml_diff>
--- a/Progression/Level Progression and Details.pptx
+++ b/Progression/Level Progression and Details.pptx
@@ -5833,7 +5833,7 @@
         <a:p>
           <a:r>
             <a:rPr lang="en-US" dirty="0"/>
-            <a:t>3 charges/level</a:t>
+            <a:t>1 charge/level</a:t>
           </a:r>
         </a:p>
       </dgm:t>
@@ -5953,7 +5953,7 @@
         <a:p>
           <a:r>
             <a:rPr lang="en-US" dirty="0"/>
-            <a:t>2.5 charges/level</a:t>
+            <a:t>1 charge/level</a:t>
           </a:r>
         </a:p>
       </dgm:t>
@@ -6079,7 +6079,7 @@
         <a:p>
           <a:r>
             <a:rPr lang="en-US" dirty="0"/>
-            <a:t>1.5 charges/level</a:t>
+            <a:t>1 charge/level</a:t>
           </a:r>
         </a:p>
       </dgm:t>
@@ -6205,7 +6205,7 @@
         <a:p>
           <a:r>
             <a:rPr lang="en-US" dirty="0"/>
-            <a:t>2 charges/level</a:t>
+            <a:t>1 charge/level</a:t>
           </a:r>
         </a:p>
       </dgm:t>
@@ -6589,16 +6589,16 @@
     <dgm:cxn modelId="{4D75D430-E189-4C85-8969-368C3A56085C}" type="presOf" srcId="{6B160A22-C82C-4FDA-BBAB-7E4ED2F8F73C}" destId="{14E2E8F5-8A25-49D9-A750-60410B935BF9}" srcOrd="0" destOrd="3" presId="urn:microsoft.com/office/officeart/2005/8/layout/cycle4"/>
     <dgm:cxn modelId="{B5B0683F-0CA9-4463-B496-DABB72B32CC7}" type="presOf" srcId="{469B766C-B556-4EE8-9491-A9A751839B59}" destId="{1D8865EB-6858-4DEB-92FD-4FABDC44B631}" srcOrd="0" destOrd="0" presId="urn:microsoft.com/office/officeart/2005/8/layout/cycle4"/>
     <dgm:cxn modelId="{E4058C3F-D27E-418F-8132-199C007C99E5}" srcId="{91602CD1-4463-4BAC-8078-62B702A67013}" destId="{FFB4490E-B971-4462-83B8-8FBDF5D2CB3F}" srcOrd="4" destOrd="0" parTransId="{EA9C3111-78FF-410F-8585-452660F7DCE4}" sibTransId="{02CF89B5-2215-4060-90D2-803A687EFCAC}"/>
+    <dgm:cxn modelId="{87132D60-DA81-44C0-9608-0197260350CB}" type="presOf" srcId="{4D02A595-0C7F-4C67-8093-416C40AE59FA}" destId="{564F5EB4-874D-47A7-99E6-3DFB95031CC9}" srcOrd="0" destOrd="0" presId="urn:microsoft.com/office/officeart/2005/8/layout/cycle4"/>
     <dgm:cxn modelId="{09DE1141-7D57-4F21-B66C-13C2BA868EC0}" type="presOf" srcId="{8ED2AAF2-3C5D-48E7-8E63-6AF1FFC07E77}" destId="{14E2E8F5-8A25-49D9-A750-60410B935BF9}" srcOrd="0" destOrd="0" presId="urn:microsoft.com/office/officeart/2005/8/layout/cycle4"/>
     <dgm:cxn modelId="{61497F41-AEFB-4364-B056-3FE6AE32D414}" srcId="{129181C5-AC07-4B54-BFFE-5F7883D3729F}" destId="{F0500DD2-5F13-4619-833A-B1D6DC29C8AC}" srcOrd="4" destOrd="0" parTransId="{853ACFBD-E7EC-40CB-99A5-173B252B0A84}" sibTransId="{DF1E5817-1321-4DA1-90B7-DF1E10E3602D}"/>
+    <dgm:cxn modelId="{3A1A2E65-D10E-45B0-B4DE-C7FB66E0A50A}" type="presOf" srcId="{6F506B8C-70D0-4916-A53C-22A961118C9F}" destId="{14E2E8F5-8A25-49D9-A750-60410B935BF9}" srcOrd="0" destOrd="2" presId="urn:microsoft.com/office/officeart/2005/8/layout/cycle4"/>
     <dgm:cxn modelId="{61BBDF48-A23F-49DF-A444-8E05834FC662}" type="presOf" srcId="{469B766C-B556-4EE8-9491-A9A751839B59}" destId="{E8D9F581-EEA3-40A1-A164-65F672A0E29A}" srcOrd="1" destOrd="0" presId="urn:microsoft.com/office/officeart/2005/8/layout/cycle4"/>
+    <dgm:cxn modelId="{DA3FF96B-2B14-4F71-88D1-2F80D4BF34BD}" srcId="{129181C5-AC07-4B54-BFFE-5F7883D3729F}" destId="{A9610716-D1B6-422B-96A4-137CBDAB958A}" srcOrd="3" destOrd="0" parTransId="{75C67503-2C64-4A4C-ABB1-E6085846228A}" sibTransId="{C3BEEA95-E4D5-49A0-A104-93F881CF9D06}"/>
+    <dgm:cxn modelId="{A029996D-4605-494E-A32F-B45855693394}" srcId="{3786977E-0081-4E6F-A434-A7C4DC4C61B5}" destId="{E34F4E63-2EE5-4F0B-A1BF-648CC434EDFE}" srcOrd="0" destOrd="0" parTransId="{F649949F-79D3-40C5-B0C6-97FD96F8D03C}" sibTransId="{4A3E1CD3-4F94-4DA6-AD97-EABE7ED14AAD}"/>
     <dgm:cxn modelId="{BABCFA52-86DE-4CB8-A2E7-3DE9F1F5272E}" type="presOf" srcId="{61F280F8-7706-40B7-AFFF-4EC2705CC187}" destId="{F29F1B7B-772D-47EC-8248-A63AE76DDE0E}" srcOrd="0" destOrd="1" presId="urn:microsoft.com/office/officeart/2005/8/layout/cycle4"/>
     <dgm:cxn modelId="{7C2F0655-CFDA-4885-8672-67058B0D20B8}" srcId="{129181C5-AC07-4B54-BFFE-5F7883D3729F}" destId="{01CFE349-64F9-4687-8B00-1DC346695752}" srcOrd="1" destOrd="0" parTransId="{0377C22A-07D3-487B-AE77-C3D1EA4322F6}" sibTransId="{ACCC8653-FDC1-43D3-9C1C-9ADF6B918B28}"/>
     <dgm:cxn modelId="{E48A4455-2711-4F6F-8899-39E6F3A2491F}" srcId="{3786977E-0081-4E6F-A434-A7C4DC4C61B5}" destId="{4DCCA0E6-961C-448C-A589-AEFCA1CD372D}" srcOrd="4" destOrd="0" parTransId="{4D343A65-728A-4298-B3F5-64670FA1A4FF}" sibTransId="{876137E3-6CD4-48EF-A986-E268B4AF4CE4}"/>
-    <dgm:cxn modelId="{87132D60-DA81-44C0-9608-0197260350CB}" type="presOf" srcId="{4D02A595-0C7F-4C67-8093-416C40AE59FA}" destId="{564F5EB4-874D-47A7-99E6-3DFB95031CC9}" srcOrd="0" destOrd="0" presId="urn:microsoft.com/office/officeart/2005/8/layout/cycle4"/>
-    <dgm:cxn modelId="{3A1A2E65-D10E-45B0-B4DE-C7FB66E0A50A}" type="presOf" srcId="{6F506B8C-70D0-4916-A53C-22A961118C9F}" destId="{14E2E8F5-8A25-49D9-A750-60410B935BF9}" srcOrd="0" destOrd="2" presId="urn:microsoft.com/office/officeart/2005/8/layout/cycle4"/>
-    <dgm:cxn modelId="{DA3FF96B-2B14-4F71-88D1-2F80D4BF34BD}" srcId="{129181C5-AC07-4B54-BFFE-5F7883D3729F}" destId="{A9610716-D1B6-422B-96A4-137CBDAB958A}" srcOrd="3" destOrd="0" parTransId="{75C67503-2C64-4A4C-ABB1-E6085846228A}" sibTransId="{C3BEEA95-E4D5-49A0-A104-93F881CF9D06}"/>
-    <dgm:cxn modelId="{A029996D-4605-494E-A32F-B45855693394}" srcId="{3786977E-0081-4E6F-A434-A7C4DC4C61B5}" destId="{E34F4E63-2EE5-4F0B-A1BF-648CC434EDFE}" srcOrd="0" destOrd="0" parTransId="{F649949F-79D3-40C5-B0C6-97FD96F8D03C}" sibTransId="{4A3E1CD3-4F94-4DA6-AD97-EABE7ED14AAD}"/>
     <dgm:cxn modelId="{72869B77-F69F-470E-9E58-859CFE09B34A}" type="presOf" srcId="{A9610716-D1B6-422B-96A4-137CBDAB958A}" destId="{56E4F748-2CAF-4D02-B107-32564BB65A58}" srcOrd="0" destOrd="3" presId="urn:microsoft.com/office/officeart/2005/8/layout/cycle4"/>
     <dgm:cxn modelId="{6FEC907F-CD3B-4DFB-9CC3-317427A60B57}" type="presOf" srcId="{41EE9423-D7E6-4ECE-A8F5-B1D526D1D538}" destId="{F29F1B7B-772D-47EC-8248-A63AE76DDE0E}" srcOrd="0" destOrd="2" presId="urn:microsoft.com/office/officeart/2005/8/layout/cycle4"/>
     <dgm:cxn modelId="{6B21957F-3E64-43CF-969F-CC697B081337}" type="presOf" srcId="{278732AA-7D4E-4AA9-BCC0-55DD759DF073}" destId="{F29F1B7B-772D-47EC-8248-A63AE76DDE0E}" srcOrd="0" destOrd="3" presId="urn:microsoft.com/office/officeart/2005/8/layout/cycle4"/>
@@ -8681,19 +8681,19 @@
     <dgm:cxn modelId="{62FA7C37-221C-4BCB-8466-2E55E7BBB6FD}" type="presOf" srcId="{8ED6BDA8-425B-457B-9D20-AEB575E60B29}" destId="{78F1B897-E188-43A4-9330-C397BF0D0855}" srcOrd="0" destOrd="1" presId="urn:microsoft.com/office/officeart/2005/8/layout/chevron2"/>
     <dgm:cxn modelId="{39FEA238-8EBC-4254-AE51-C0F7A3C9D57E}" srcId="{8C5B6F21-0C38-4F66-897F-CCECCEB0A3C9}" destId="{191919E1-6A60-4840-9C04-5DA616DFC41A}" srcOrd="0" destOrd="0" parTransId="{CE193355-8639-48AE-93D4-6DA334E5FB26}" sibTransId="{83FAD8CB-E635-4342-B837-8BB3B1B9B486}"/>
     <dgm:cxn modelId="{6E54B439-2FE9-425B-A141-FB901E1F9682}" srcId="{8C5B6F21-0C38-4F66-897F-CCECCEB0A3C9}" destId="{8ED6BDA8-425B-457B-9D20-AEB575E60B29}" srcOrd="1" destOrd="0" parTransId="{28CE94B7-FA06-4A67-AE65-ED523705A372}" sibTransId="{08402A94-2530-4FA2-9CC6-F605C6165CD5}"/>
-    <dgm:cxn modelId="{DDA63C46-0BE5-40CD-9199-4C50F2D0C522}" srcId="{BF644CDE-E167-4B33-A0DF-B58E316A5AD0}" destId="{E16458BD-E440-439D-AB58-5F87F35D4383}" srcOrd="2" destOrd="0" parTransId="{DF37FF22-0840-4859-81F7-57F3F2CB9052}" sibTransId="{978715E7-F29C-44DE-8282-FC252B7C16B8}"/>
-    <dgm:cxn modelId="{9D744557-8732-4224-8F96-75ED430354C4}" type="presOf" srcId="{4F91AE12-6E94-4143-8265-4C7FB16E249B}" destId="{78F1B897-E188-43A4-9330-C397BF0D0855}" srcOrd="0" destOrd="2" presId="urn:microsoft.com/office/officeart/2005/8/layout/chevron2"/>
-    <dgm:cxn modelId="{91A5F559-AB92-4844-ACAC-D91D5E24B014}" srcId="{A09D3380-E108-460A-9494-485B79B3224D}" destId="{B5366D7A-4E09-40F8-9DFE-AC579CE33B39}" srcOrd="1" destOrd="0" parTransId="{9BBFD2DD-B30F-4A7E-8EB5-D6AAD92B67AE}" sibTransId="{9377C4DC-F661-4851-AD0E-1AA5B03A7D3D}"/>
     <dgm:cxn modelId="{3A17F95F-FF97-4B42-A3E8-4B893A94812A}" type="presOf" srcId="{E535B789-B259-447F-BF3E-0601F007B93E}" destId="{452ED429-083D-425D-9A0E-BD53C5D97A1F}" srcOrd="0" destOrd="2" presId="urn:microsoft.com/office/officeart/2005/8/layout/chevron2"/>
     <dgm:cxn modelId="{3513F962-1060-4370-B8EB-EA856760898D}" srcId="{8C714EC5-8BFB-4CA5-B864-6F0F2E7AD32F}" destId="{895734D7-66BC-43F4-8D84-5E470577F758}" srcOrd="1" destOrd="0" parTransId="{56740A28-C571-4CA5-8A03-97BA2BF2F79B}" sibTransId="{446C683C-F94E-4D4F-A647-B3DDB3589190}"/>
+    <dgm:cxn modelId="{DDA63C46-0BE5-40CD-9199-4C50F2D0C522}" srcId="{BF644CDE-E167-4B33-A0DF-B58E316A5AD0}" destId="{E16458BD-E440-439D-AB58-5F87F35D4383}" srcOrd="2" destOrd="0" parTransId="{DF37FF22-0840-4859-81F7-57F3F2CB9052}" sibTransId="{978715E7-F29C-44DE-8282-FC252B7C16B8}"/>
     <dgm:cxn modelId="{2F100669-1B99-4194-AA27-8FA46B925B44}" srcId="{A7D34155-6CF6-40CC-B87E-BC82C1D52F11}" destId="{E535B789-B259-447F-BF3E-0601F007B93E}" srcOrd="2" destOrd="0" parTransId="{5F6719AB-5584-4BB4-955C-46BCACDC232C}" sibTransId="{04B04BCA-3EE9-4E42-9916-ABEA80AF6216}"/>
     <dgm:cxn modelId="{8084F76C-D59D-44F3-B248-65A0B5BDD28A}" type="presOf" srcId="{8C5B6F21-0C38-4F66-897F-CCECCEB0A3C9}" destId="{57A2C4DB-87E7-42FF-89FD-6FF6BD012007}" srcOrd="0" destOrd="0" presId="urn:microsoft.com/office/officeart/2005/8/layout/chevron2"/>
     <dgm:cxn modelId="{FDE11D6D-538F-4A61-A1EC-F1E62A8ED7AB}" srcId="{A7D34155-6CF6-40CC-B87E-BC82C1D52F11}" destId="{0B29E42E-30A2-4A55-B8E1-1D11A319FCD3}" srcOrd="1" destOrd="0" parTransId="{0A28DBCB-3B02-43B4-80E1-23883E54AF90}" sibTransId="{A41D38C4-D1DB-4B2C-88C4-34672C4A2E9F}"/>
     <dgm:cxn modelId="{9D609F6E-DAD8-49DE-AFD2-1EB2A055C58A}" type="presOf" srcId="{1657685F-53FB-475A-9725-5900D4D6DCFE}" destId="{C161C074-0B79-413F-B6B6-237D9D333546}" srcOrd="0" destOrd="2" presId="urn:microsoft.com/office/officeart/2005/8/layout/chevron2"/>
     <dgm:cxn modelId="{3B80406F-8139-44A2-B349-B3B46EBF3F3B}" srcId="{BF644CDE-E167-4B33-A0DF-B58E316A5AD0}" destId="{56E1E308-79E8-4A41-8E58-9D189E845E59}" srcOrd="1" destOrd="0" parTransId="{D0139554-1845-4546-9871-18BABD898690}" sibTransId="{C208EB29-A4F7-4933-AB5B-148FA852475B}"/>
     <dgm:cxn modelId="{B6C07573-8CAB-429A-B2BE-35831A53FC5C}" type="presOf" srcId="{543D8CB2-C1AB-4E79-9824-71677479D55A}" destId="{716C0236-A53D-4871-8D97-A78B9D115DA9}" srcOrd="0" destOrd="0" presId="urn:microsoft.com/office/officeart/2005/8/layout/chevron2"/>
+    <dgm:cxn modelId="{9D744557-8732-4224-8F96-75ED430354C4}" type="presOf" srcId="{4F91AE12-6E94-4143-8265-4C7FB16E249B}" destId="{78F1B897-E188-43A4-9330-C397BF0D0855}" srcOrd="0" destOrd="2" presId="urn:microsoft.com/office/officeart/2005/8/layout/chevron2"/>
     <dgm:cxn modelId="{D00B8477-90CD-4003-B17E-32CA96C5B851}" srcId="{54D81FC5-1B48-429B-BCEB-7AF2A2F03056}" destId="{BE6BBEB0-46A2-43A5-A2D9-99E4A6CDCF72}" srcOrd="0" destOrd="0" parTransId="{61928C54-2AD6-4680-AD65-B1075642E801}" sibTransId="{B3D6ECBB-53CA-42FE-9EF8-EBC837DA5669}"/>
     <dgm:cxn modelId="{58655878-F949-459D-8811-77E6ECD46B8C}" type="presOf" srcId="{0DEBA2BD-F6A1-4359-A2A7-6A87D724C86E}" destId="{E1C5D451-79BC-450F-B821-68EA21BB90D6}" srcOrd="0" destOrd="2" presId="urn:microsoft.com/office/officeart/2005/8/layout/chevron2"/>
+    <dgm:cxn modelId="{91A5F559-AB92-4844-ACAC-D91D5E24B014}" srcId="{A09D3380-E108-460A-9494-485B79B3224D}" destId="{B5366D7A-4E09-40F8-9DFE-AC579CE33B39}" srcOrd="1" destOrd="0" parTransId="{9BBFD2DD-B30F-4A7E-8EB5-D6AAD92B67AE}" sibTransId="{9377C4DC-F661-4851-AD0E-1AA5B03A7D3D}"/>
     <dgm:cxn modelId="{6678367C-BD7E-4E3F-9533-5322B21E53B8}" srcId="{A09D3380-E108-460A-9494-485B79B3224D}" destId="{A7D34155-6CF6-40CC-B87E-BC82C1D52F11}" srcOrd="5" destOrd="0" parTransId="{E5ADE60B-9C63-48E5-AB6E-7533874E100E}" sibTransId="{E8365ED4-FF6D-411E-A203-E80CE59B825B}"/>
     <dgm:cxn modelId="{575BC67C-9394-40CB-B57B-DB7F259CCA3A}" srcId="{A09D3380-E108-460A-9494-485B79B3224D}" destId="{529E63AB-A0B0-4A07-8F36-78DB27A6B731}" srcOrd="7" destOrd="0" parTransId="{2F11A452-E3F9-4B65-814A-1BAF7AC8A3B4}" sibTransId="{1FE84D1A-4D12-4041-928F-A8E16FC7F60A}"/>
     <dgm:cxn modelId="{8849FD82-F733-4303-A85B-3BABF2158F38}" type="presOf" srcId="{191919E1-6A60-4840-9C04-5DA616DFC41A}" destId="{78F1B897-E188-43A4-9330-C397BF0D0855}" srcOrd="0" destOrd="0" presId="urn:microsoft.com/office/officeart/2005/8/layout/chevron2"/>
@@ -9070,7 +9070,7 @@
                 <a:schemeClr val="bg1"/>
               </a:solidFill>
             </a:rPr>
-            <a:t>2 - +1 Health</a:t>
+            <a:t>2 - May use a Heavy Shield as if it were a Small Shield</a:t>
           </a:r>
         </a:p>
       </dgm:t>
@@ -9119,7 +9119,7 @@
                 <a:schemeClr val="bg1"/>
               </a:solidFill>
             </a:rPr>
-            <a:t>3 – May use a Heavy Shield as if it were a Small Shield</a:t>
+            <a:t>3 – +2 Health</a:t>
           </a:r>
           <a:br>
             <a:rPr lang="en-US" dirty="0">
@@ -9391,8 +9391,35 @@
                 <a:schemeClr val="bg1"/>
               </a:solidFill>
             </a:rPr>
-            <a:t>2 - +.5 Charges/level</a:t>
+            <a:t>2 - Rejuvenation Potions no longer cause negative effects</a:t>
           </a:r>
+          <a:br>
+            <a:rPr lang="en-US" dirty="0">
+              <a:solidFill>
+                <a:schemeClr val="bg1"/>
+              </a:solidFill>
+            </a:rPr>
+          </a:br>
+          <a:r>
+            <a:rPr lang="en-US" dirty="0">
+              <a:solidFill>
+                <a:schemeClr val="bg1"/>
+              </a:solidFill>
+            </a:rPr>
+            <a:t>3 – +2 Charges</a:t>
+          </a:r>
+          <a:br>
+            <a:rPr lang="en-US" dirty="0">
+              <a:solidFill>
+                <a:schemeClr val="bg1"/>
+              </a:solidFill>
+            </a:rPr>
+          </a:br>
+          <a:endParaRPr lang="en-US" dirty="0">
+            <a:solidFill>
+              <a:schemeClr val="bg1"/>
+            </a:solidFill>
+          </a:endParaRPr>
         </a:p>
       </dgm:t>
     </dgm:pt>
@@ -9640,77 +9667,6 @@
       </dgm:t>
     </dgm:pt>
     <dgm:pt modelId="{12586A8E-AFD2-45A3-9C0B-3128AE34846B}" type="sibTrans" cxnId="{74C194D0-A48F-4196-82AD-47E4033FD782}">
-      <dgm:prSet/>
-      <dgm:spPr/>
-      <dgm:t>
-        <a:bodyPr/>
-        <a:lstStyle/>
-        <a:p>
-          <a:endParaRPr lang="en-US"/>
-        </a:p>
-      </dgm:t>
-    </dgm:pt>
-    <dgm:pt modelId="{591645E5-50FE-482F-88B6-847517EED511}">
-      <dgm:prSet phldrT="[Text]"/>
-      <dgm:spPr>
-        <a:solidFill>
-          <a:srgbClr val="5B9BD5"/>
-        </a:solidFill>
-        <a:ln>
-          <a:solidFill>
-            <a:schemeClr val="tx1"/>
-          </a:solidFill>
-        </a:ln>
-      </dgm:spPr>
-      <dgm:t>
-        <a:bodyPr/>
-        <a:lstStyle/>
-        <a:p>
-          <a:r>
-            <a:rPr lang="en-US" dirty="0">
-              <a:solidFill>
-                <a:schemeClr val="bg1"/>
-              </a:solidFill>
-            </a:rPr>
-            <a:t>3 – Rejuvenation Potions no longer cause negative effects</a:t>
-          </a:r>
-          <a:br>
-            <a:rPr lang="en-US" dirty="0">
-              <a:solidFill>
-                <a:schemeClr val="bg1"/>
-              </a:solidFill>
-            </a:rPr>
-          </a:br>
-          <a:br>
-            <a:rPr lang="en-US" dirty="0">
-              <a:solidFill>
-                <a:schemeClr val="bg1"/>
-              </a:solidFill>
-            </a:rPr>
-          </a:br>
-          <a:r>
-            <a:rPr lang="en-US" b="1" dirty="0">
-              <a:solidFill>
-                <a:schemeClr val="bg1"/>
-              </a:solidFill>
-            </a:rPr>
-            <a:t>MIND OVER MATTER:</a:t>
-          </a:r>
-        </a:p>
-      </dgm:t>
-    </dgm:pt>
-    <dgm:pt modelId="{1B003998-9D1D-4DFA-98E4-2D906D66D9BC}" type="parTrans" cxnId="{96F1430C-2D5E-45C7-A326-3EEF607300D8}">
-      <dgm:prSet/>
-      <dgm:spPr/>
-      <dgm:t>
-        <a:bodyPr/>
-        <a:lstStyle/>
-        <a:p>
-          <a:endParaRPr lang="en-US"/>
-        </a:p>
-      </dgm:t>
-    </dgm:pt>
-    <dgm:pt modelId="{39E2F493-75CC-4F0C-9E2C-015171C50CFE}" type="sibTrans" cxnId="{96F1430C-2D5E-45C7-A326-3EEF607300D8}">
       <dgm:prSet/>
       <dgm:spPr/>
       <dgm:t>
@@ -10462,6 +10418,63 @@
         </a:p>
       </dgm:t>
     </dgm:pt>
+    <dgm:pt modelId="{CD9C1EAC-D8C6-4F94-BAF5-730199CD2DEC}">
+      <dgm:prSet phldrT="[Text]"/>
+      <dgm:spPr>
+        <a:solidFill>
+          <a:srgbClr val="5B9BD5"/>
+        </a:solidFill>
+        <a:ln>
+          <a:solidFill>
+            <a:schemeClr val="tx1"/>
+          </a:solidFill>
+        </a:ln>
+      </dgm:spPr>
+      <dgm:t>
+        <a:bodyPr/>
+        <a:lstStyle/>
+        <a:p>
+          <a:pPr>
+            <a:buNone/>
+          </a:pPr>
+          <a:r>
+            <a:rPr lang="en-US" b="1" dirty="0">
+              <a:solidFill>
+                <a:schemeClr val="bg1"/>
+              </a:solidFill>
+            </a:rPr>
+            <a:t>MIND OVER MATTER:</a:t>
+          </a:r>
+          <a:endParaRPr lang="en-US" dirty="0">
+            <a:solidFill>
+              <a:schemeClr val="bg1"/>
+            </a:solidFill>
+          </a:endParaRPr>
+        </a:p>
+      </dgm:t>
+    </dgm:pt>
+    <dgm:pt modelId="{7F1F8FF5-CC5D-42E7-BD70-D76077148626}" type="parTrans" cxnId="{66124487-066E-40EF-BE70-244304394B19}">
+      <dgm:prSet/>
+      <dgm:spPr/>
+      <dgm:t>
+        <a:bodyPr/>
+        <a:lstStyle/>
+        <a:p>
+          <a:endParaRPr lang="en-US"/>
+        </a:p>
+      </dgm:t>
+    </dgm:pt>
+    <dgm:pt modelId="{C29BABAA-2FCA-480E-B642-DBFCD6D562EF}" type="sibTrans" cxnId="{66124487-066E-40EF-BE70-244304394B19}">
+      <dgm:prSet/>
+      <dgm:spPr/>
+      <dgm:t>
+        <a:bodyPr/>
+        <a:lstStyle/>
+        <a:p>
+          <a:endParaRPr lang="en-US"/>
+        </a:p>
+      </dgm:t>
+    </dgm:pt>
     <dgm:pt modelId="{8FCD8AD1-7494-4B0A-8447-F5A82C787D6E}" type="pres">
       <dgm:prSet presAssocID="{5FB694C5-7255-4CF9-B98A-150192F1A4E6}" presName="linearFlow" presStyleCnt="0">
         <dgm:presLayoutVars>
@@ -10682,7 +10695,6 @@
     <dgm:cxn modelId="{FF873A06-991A-401D-8F98-11C975AA35AC}" srcId="{5FB694C5-7255-4CF9-B98A-150192F1A4E6}" destId="{ABDE9DE6-FA38-4D4D-89FA-CF61D263908C}" srcOrd="3" destOrd="0" parTransId="{B76CA281-161C-4082-91B5-C13B97987B70}" sibTransId="{3B7F5DDC-E0BB-4D7F-A66D-3617E497BF13}"/>
     <dgm:cxn modelId="{C0FCDF07-1396-43DA-B903-7DBDCFF44528}" type="presOf" srcId="{FAD04D7E-59E4-48A9-BEC3-82AC2FA88B33}" destId="{F372C384-A43C-461B-BE70-F1BB7F118571}" srcOrd="0" destOrd="2" presId="urn:microsoft.com/office/officeart/2005/8/layout/hList2"/>
     <dgm:cxn modelId="{DB0E3A08-7E07-40F7-8C84-362D0542165C}" srcId="{71D548C6-0C6D-49AB-9BC1-EDAA229E9E5B}" destId="{5885D3F1-1088-4BA3-A4CD-21D93F4201C0}" srcOrd="6" destOrd="0" parTransId="{C2674CB5-ECF9-435F-B7D7-81002D0FAE8A}" sibTransId="{49E9A1A7-6DED-4975-86C4-635B9F760224}"/>
-    <dgm:cxn modelId="{96F1430C-2D5E-45C7-A326-3EEF607300D8}" srcId="{71D548C6-0C6D-49AB-9BC1-EDAA229E9E5B}" destId="{591645E5-50FE-482F-88B6-847517EED511}" srcOrd="2" destOrd="0" parTransId="{1B003998-9D1D-4DFA-98E4-2D906D66D9BC}" sibTransId="{39E2F493-75CC-4F0C-9E2C-015171C50CFE}"/>
     <dgm:cxn modelId="{5D4DBB0F-1229-46E5-9072-A72533CC9BBA}" type="presOf" srcId="{4546B203-7256-4205-8586-C7426DFFA461}" destId="{AA1A76A8-F74B-4628-BC91-616322035114}" srcOrd="0" destOrd="5" presId="urn:microsoft.com/office/officeart/2005/8/layout/hList2"/>
     <dgm:cxn modelId="{39A3B121-FBAD-4D2D-AC8A-47D88E206DAC}" srcId="{ABDE9DE6-FA38-4D4D-89FA-CF61D263908C}" destId="{5ACADF30-54CA-4018-B451-D7697B4F2112}" srcOrd="3" destOrd="0" parTransId="{91C67D92-9D8E-46B4-9AB8-466717946348}" sibTransId="{78EE528E-8530-4BB4-ACE4-C43C4F042C48}"/>
     <dgm:cxn modelId="{DED50B22-482B-495C-8D87-78204615D211}" srcId="{71D548C6-0C6D-49AB-9BC1-EDAA229E9E5B}" destId="{5B97E2E6-2E54-48D5-8275-5C2F278F9DA0}" srcOrd="1" destOrd="0" parTransId="{C7D0BF3C-2314-4768-9B28-DC35EB0240D7}" sibTransId="{86D64380-A9CC-46D7-AF8F-1D18E4E3EF03}"/>
@@ -10696,22 +10708,24 @@
     <dgm:cxn modelId="{5EBF0338-3215-4EBE-8E50-1D96C0C11CA8}" srcId="{0B0BD153-3549-443C-B5FB-B59DCDEFBC38}" destId="{1079F961-0D4F-4519-AF2D-D76DB0F925D4}" srcOrd="4" destOrd="0" parTransId="{B1F7F8A2-B7F0-44B9-A7EF-A514B2625B70}" sibTransId="{953B9C2E-EEC3-4B53-8304-DDAA34916716}"/>
     <dgm:cxn modelId="{9DD60A3E-C4D0-4276-9C9A-DF78BE27DCEC}" type="presOf" srcId="{AC85C493-A10B-49BD-9904-0368D36C4E39}" destId="{2A0E8E76-35C0-47E9-8A95-232C3B7C5140}" srcOrd="0" destOrd="1" presId="urn:microsoft.com/office/officeart/2005/8/layout/hList2"/>
     <dgm:cxn modelId="{3320D83F-930D-4B12-8E54-7A3C4F33C012}" type="presOf" srcId="{5ACADF30-54CA-4018-B451-D7697B4F2112}" destId="{F372C384-A43C-461B-BE70-F1BB7F118571}" srcOrd="0" destOrd="3" presId="urn:microsoft.com/office/officeart/2005/8/layout/hList2"/>
+    <dgm:cxn modelId="{DE5E295B-D5E2-4ED9-8BFE-1956B1545A70}" type="presOf" srcId="{02047A8A-FCD5-457B-9259-1F0037320820}" destId="{F372C384-A43C-461B-BE70-F1BB7F118571}" srcOrd="0" destOrd="5" presId="urn:microsoft.com/office/officeart/2005/8/layout/hList2"/>
+    <dgm:cxn modelId="{1D01575F-7A0A-47C0-BC75-0C5D10FA8591}" srcId="{0B0BD153-3549-443C-B5FB-B59DCDEFBC38}" destId="{FAB0A96C-87D4-4A86-9895-FA3494903DA6}" srcOrd="6" destOrd="0" parTransId="{D42269A6-11FA-481D-9C96-4A69AD7294B5}" sibTransId="{04DB4303-D15C-4EEA-B836-BF2770D03370}"/>
+    <dgm:cxn modelId="{70CB1561-6F5A-400E-A923-A487312DEFE7}" type="presOf" srcId="{1FA44D0F-8941-4DF7-8AFB-BA37A1F53B45}" destId="{2A0E8E76-35C0-47E9-8A95-232C3B7C5140}" srcOrd="0" destOrd="5" presId="urn:microsoft.com/office/officeart/2005/8/layout/hList2"/>
     <dgm:cxn modelId="{DE554B45-39EC-4A74-BC87-49BC5E31384A}" srcId="{71D548C6-0C6D-49AB-9BC1-EDAA229E9E5B}" destId="{B501AFD4-0435-4670-84B2-473BC5EA7271}" srcOrd="3" destOrd="0" parTransId="{8D709AFB-21F5-4AF0-BBF8-E4B5E7F3660D}" sibTransId="{2966CE37-9950-49D5-A576-4C4FE0A2CCAA}"/>
     <dgm:cxn modelId="{C1A36E45-7B2D-497A-9524-BBAB7EDAB76A}" type="presOf" srcId="{D1937F96-9A1B-4E34-81D6-8F85D3DE8B0A}" destId="{2A0E8E76-35C0-47E9-8A95-232C3B7C5140}" srcOrd="0" destOrd="0" presId="urn:microsoft.com/office/officeart/2005/8/layout/hList2"/>
     <dgm:cxn modelId="{287CD847-D6C2-445F-923E-C5CB563CD6F9}" srcId="{71D548C6-0C6D-49AB-9BC1-EDAA229E9E5B}" destId="{2C7957CF-CF0A-4C9F-95C6-0BF58B63659B}" srcOrd="4" destOrd="0" parTransId="{98CF34BE-9CAD-4A7A-BBA2-BB9269E8A380}" sibTransId="{7D94AD20-21D7-4ABB-8921-C1E6578158AB}"/>
     <dgm:cxn modelId="{B7ACDC48-5A80-4FD4-9726-D64408291E22}" srcId="{5FB694C5-7255-4CF9-B98A-150192F1A4E6}" destId="{0B0BD153-3549-443C-B5FB-B59DCDEFBC38}" srcOrd="1" destOrd="0" parTransId="{EBED15F1-2D40-4579-AA61-F51BF5097C28}" sibTransId="{0AD89291-E988-46EE-8457-C57674D25867}"/>
     <dgm:cxn modelId="{A08D6F4C-F2CE-4322-9F9D-ACDDECBD0563}" type="presOf" srcId="{FAB0A96C-87D4-4A86-9895-FA3494903DA6}" destId="{3D08A11F-14D6-4A61-B006-13ACC9B89A7B}" srcOrd="0" destOrd="6" presId="urn:microsoft.com/office/officeart/2005/8/layout/hList2"/>
     <dgm:cxn modelId="{EADDCB4C-02C4-43F7-9C66-6F96FD9FED70}" type="presOf" srcId="{0B0BD153-3549-443C-B5FB-B59DCDEFBC38}" destId="{6220FDE6-632F-4EE2-B096-42B6C32316BB}" srcOrd="0" destOrd="0" presId="urn:microsoft.com/office/officeart/2005/8/layout/hList2"/>
-    <dgm:cxn modelId="{DE5E295B-D5E2-4ED9-8BFE-1956B1545A70}" type="presOf" srcId="{02047A8A-FCD5-457B-9259-1F0037320820}" destId="{F372C384-A43C-461B-BE70-F1BB7F118571}" srcOrd="0" destOrd="5" presId="urn:microsoft.com/office/officeart/2005/8/layout/hList2"/>
-    <dgm:cxn modelId="{1D01575F-7A0A-47C0-BC75-0C5D10FA8591}" srcId="{0B0BD153-3549-443C-B5FB-B59DCDEFBC38}" destId="{FAB0A96C-87D4-4A86-9895-FA3494903DA6}" srcOrd="6" destOrd="0" parTransId="{D42269A6-11FA-481D-9C96-4A69AD7294B5}" sibTransId="{04DB4303-D15C-4EEA-B836-BF2770D03370}"/>
-    <dgm:cxn modelId="{70CB1561-6F5A-400E-A923-A487312DEFE7}" type="presOf" srcId="{1FA44D0F-8941-4DF7-8AFB-BA37A1F53B45}" destId="{2A0E8E76-35C0-47E9-8A95-232C3B7C5140}" srcOrd="0" destOrd="5" presId="urn:microsoft.com/office/officeart/2005/8/layout/hList2"/>
     <dgm:cxn modelId="{45B14C6E-7F34-44EC-8C68-8B3BBCF8FD42}" srcId="{ABDE9DE6-FA38-4D4D-89FA-CF61D263908C}" destId="{DAB60B48-8900-4694-9C46-FB8116B113C1}" srcOrd="4" destOrd="0" parTransId="{98C283A6-D943-4F4B-8D60-AE6105383DAF}" sibTransId="{37043FF1-307C-487F-846F-93EA32F4811C}"/>
     <dgm:cxn modelId="{6296C073-77AD-4A15-B643-642BAEF9C7EE}" type="presOf" srcId="{71297CFA-1CE3-4A92-94A4-AAF712792EEA}" destId="{3D08A11F-14D6-4A61-B006-13ACC9B89A7B}" srcOrd="0" destOrd="5" presId="urn:microsoft.com/office/officeart/2005/8/layout/hList2"/>
     <dgm:cxn modelId="{3DD1FF75-E146-434D-95C6-B725A8442115}" srcId="{71D548C6-0C6D-49AB-9BC1-EDAA229E9E5B}" destId="{4546B203-7256-4205-8586-C7426DFFA461}" srcOrd="5" destOrd="0" parTransId="{E5716B4B-1E2B-420B-8550-DE5D5EF844D5}" sibTransId="{C958FFD3-CA4A-4FC1-8C36-B710EC8A58A5}"/>
     <dgm:cxn modelId="{94D6F37E-2632-42BE-BC88-8844C33A11F8}" type="presOf" srcId="{83EBA497-1E8E-4988-833B-FC7A344264C1}" destId="{2A0E8E76-35C0-47E9-8A95-232C3B7C5140}" srcOrd="0" destOrd="2" presId="urn:microsoft.com/office/officeart/2005/8/layout/hList2"/>
     <dgm:cxn modelId="{4D6D6280-C22E-4D3F-B8F4-6A6455B31979}" type="presOf" srcId="{8C4B844B-BB6F-47EA-9D86-C6700D231E26}" destId="{F372C384-A43C-461B-BE70-F1BB7F118571}" srcOrd="0" destOrd="1" presId="urn:microsoft.com/office/officeart/2005/8/layout/hList2"/>
+    <dgm:cxn modelId="{4041EF83-92F2-4D63-9BEE-D11F41993F1E}" type="presOf" srcId="{CD9C1EAC-D8C6-4F94-BAF5-730199CD2DEC}" destId="{AA1A76A8-F74B-4628-BC91-616322035114}" srcOrd="0" destOrd="2" presId="urn:microsoft.com/office/officeart/2005/8/layout/hList2"/>
     <dgm:cxn modelId="{7B6F5C86-AE3E-45EC-A8D6-83B1EA1DA1A2}" type="presOf" srcId="{C9F1F9FD-C29A-4952-A65F-14ADDCCCA189}" destId="{7169E44B-598E-479A-A6C8-3C8BD4067E1B}" srcOrd="0" destOrd="0" presId="urn:microsoft.com/office/officeart/2005/8/layout/hList2"/>
     <dgm:cxn modelId="{672AB386-C8BE-45A1-BFD7-99C6ECD0D734}" srcId="{0B0BD153-3549-443C-B5FB-B59DCDEFBC38}" destId="{1AC5FF4D-F017-457B-92AA-C280CA1BEFFD}" srcOrd="1" destOrd="0" parTransId="{A6D0DDF3-CBA0-4DC4-B435-48A60D61097B}" sibTransId="{FFCB55F9-B333-49C6-9BA7-45FF72E04F95}"/>
+    <dgm:cxn modelId="{66124487-066E-40EF-BE70-244304394B19}" srcId="{71D548C6-0C6D-49AB-9BC1-EDAA229E9E5B}" destId="{CD9C1EAC-D8C6-4F94-BAF5-730199CD2DEC}" srcOrd="2" destOrd="0" parTransId="{7F1F8FF5-CC5D-42E7-BD70-D76077148626}" sibTransId="{C29BABAA-2FCA-480E-B642-DBFCD6D562EF}"/>
     <dgm:cxn modelId="{12CE6D8B-6F3D-430D-A7BA-D5585770F709}" type="presOf" srcId="{EF100D7E-23BE-4EA4-8F21-39F8C282B6C4}" destId="{3D08A11F-14D6-4A61-B006-13ACC9B89A7B}" srcOrd="0" destOrd="2" presId="urn:microsoft.com/office/officeart/2005/8/layout/hList2"/>
     <dgm:cxn modelId="{F825668C-6A3E-4847-8F39-FF87B42B4C56}" srcId="{C9F1F9FD-C29A-4952-A65F-14ADDCCCA189}" destId="{23236546-3A02-4DBE-87DB-A8A087188CB0}" srcOrd="6" destOrd="0" parTransId="{DADDE549-8AF6-48BB-BEFC-CDFF192872FC}" sibTransId="{3CE508A3-44E2-4D64-8C8F-DEB8C1A3D102}"/>
     <dgm:cxn modelId="{36F7BD95-F1C8-42AA-AAF7-BDCA11A4D967}" srcId="{C9F1F9FD-C29A-4952-A65F-14ADDCCCA189}" destId="{7104D079-880D-4C25-8499-EEE8BF01E9B2}" srcOrd="3" destOrd="0" parTransId="{0E116152-B08B-4E19-8A81-984542AF3158}" sibTransId="{C49206E4-10DB-4C71-BBA3-AAF93A03DB54}"/>
@@ -10723,7 +10737,6 @@
     <dgm:cxn modelId="{D4C0CCA2-68BB-4189-B51C-BB6899B1ED59}" type="presOf" srcId="{71D548C6-0C6D-49AB-9BC1-EDAA229E9E5B}" destId="{D042C7C9-BFCE-4EFE-8508-2D8C9A0B12C2}" srcOrd="0" destOrd="0" presId="urn:microsoft.com/office/officeart/2005/8/layout/hList2"/>
     <dgm:cxn modelId="{CA8964A7-18C8-4823-88EF-12F2C51ACD04}" type="presOf" srcId="{794A8658-F284-4B8D-9CDB-702EB9F39C53}" destId="{F372C384-A43C-461B-BE70-F1BB7F118571}" srcOrd="0" destOrd="0" presId="urn:microsoft.com/office/officeart/2005/8/layout/hList2"/>
     <dgm:cxn modelId="{B352EFAB-941D-4DEC-8A0D-6807BBD46D3F}" srcId="{0B0BD153-3549-443C-B5FB-B59DCDEFBC38}" destId="{82E33EE1-714F-40E0-BFBD-BF7FBA73702E}" srcOrd="0" destOrd="0" parTransId="{F9EF247F-8DD5-46ED-82D6-DF342F88F23D}" sibTransId="{4011BCCD-246A-4933-A84A-0886754DF76B}"/>
-    <dgm:cxn modelId="{C1C9C9B6-8609-4356-BBC0-0EF9775D969D}" type="presOf" srcId="{591645E5-50FE-482F-88B6-847517EED511}" destId="{AA1A76A8-F74B-4628-BC91-616322035114}" srcOrd="0" destOrd="2" presId="urn:microsoft.com/office/officeart/2005/8/layout/hList2"/>
     <dgm:cxn modelId="{B24E73BD-9724-40E9-933E-9936EE0209D9}" srcId="{5FB694C5-7255-4CF9-B98A-150192F1A4E6}" destId="{C9F1F9FD-C29A-4952-A65F-14ADDCCCA189}" srcOrd="0" destOrd="0" parTransId="{50815C4B-5F26-4B74-A40C-A71542F8B00E}" sibTransId="{0AFFB973-CCE9-4A67-9367-A83E1AA3EE48}"/>
     <dgm:cxn modelId="{5533DCC7-B214-4787-8A0F-B9260A3CEB24}" srcId="{C9F1F9FD-C29A-4952-A65F-14ADDCCCA189}" destId="{D1937F96-9A1B-4E34-81D6-8F85D3DE8B0A}" srcOrd="0" destOrd="0" parTransId="{9B153826-FA19-4322-963B-0BE82B8A759F}" sibTransId="{51CDC57E-CED6-46EA-8F7E-0801CA8FBA44}"/>
     <dgm:cxn modelId="{AD948FCB-729F-4773-B141-4A5393558550}" type="presOf" srcId="{2B087527-BCC4-4FB7-BD76-6A51F25DE320}" destId="{AA1A76A8-F74B-4628-BC91-616322035114}" srcOrd="0" destOrd="0" presId="urn:microsoft.com/office/officeart/2005/8/layout/hList2"/>
@@ -11422,8 +11435,8 @@
     <dgm:cxn modelId="{60A64617-54B7-4574-8B4E-8D79D7535048}" type="presOf" srcId="{AA555591-2097-494C-A41A-D12B96D9EB1F}" destId="{AB045FBD-BA05-4EA5-9D87-1E47CF76C7FE}" srcOrd="0" destOrd="0" presId="urn:microsoft.com/office/officeart/2008/layout/LinedList"/>
     <dgm:cxn modelId="{FCCC212A-E9C0-40EC-B03E-344600689B92}" srcId="{684A4583-4B24-4A57-9325-3735C4DEDE4F}" destId="{927F5C21-2D5A-45CF-BC38-A38184A944E3}" srcOrd="5" destOrd="0" parTransId="{56187B60-9D71-4FD0-BE69-600461467905}" sibTransId="{09C96971-AA2A-45CA-B9E7-03AC978C8538}"/>
     <dgm:cxn modelId="{7DFC8632-8134-4EF6-886C-41D8E5E4977C}" srcId="{AA555591-2097-494C-A41A-D12B96D9EB1F}" destId="{684A4583-4B24-4A57-9325-3735C4DEDE4F}" srcOrd="0" destOrd="0" parTransId="{6EA72475-67D1-479D-AC8C-BDA65C5D0806}" sibTransId="{8C9F8D0D-7658-4C54-8D07-59C5B9791BA6}"/>
+    <dgm:cxn modelId="{C791D961-C8CD-4EC8-8CF0-2F8965B0B33D}" type="presOf" srcId="{684A4583-4B24-4A57-9325-3735C4DEDE4F}" destId="{74A6C15A-A058-408E-AF34-284713A10187}" srcOrd="0" destOrd="0" presId="urn:microsoft.com/office/officeart/2008/layout/LinedList"/>
     <dgm:cxn modelId="{46FB1353-2CDF-4169-AF40-DA8316193977}" srcId="{684A4583-4B24-4A57-9325-3735C4DEDE4F}" destId="{598A008A-3699-4D98-B094-4F46EADEFFF5}" srcOrd="0" destOrd="0" parTransId="{5B9899E8-7FC2-431C-96E0-8EF9F9607556}" sibTransId="{D3FA52B7-7AD1-4876-B6F0-82374149A222}"/>
-    <dgm:cxn modelId="{C791D961-C8CD-4EC8-8CF0-2F8965B0B33D}" type="presOf" srcId="{684A4583-4B24-4A57-9325-3735C4DEDE4F}" destId="{74A6C15A-A058-408E-AF34-284713A10187}" srcOrd="0" destOrd="0" presId="urn:microsoft.com/office/officeart/2008/layout/LinedList"/>
     <dgm:cxn modelId="{E56EC97B-281E-43B4-90DE-3322579632BF}" type="presOf" srcId="{927F5C21-2D5A-45CF-BC38-A38184A944E3}" destId="{CE147BAB-2568-41FA-B313-86F32EF0165C}" srcOrd="0" destOrd="0" presId="urn:microsoft.com/office/officeart/2008/layout/LinedList"/>
     <dgm:cxn modelId="{38906C93-0B91-4640-91AC-1FF5B7069DBD}" srcId="{684A4583-4B24-4A57-9325-3735C4DEDE4F}" destId="{F00BAD88-E21E-4F83-8D34-3AE7B7771110}" srcOrd="2" destOrd="0" parTransId="{A7849EE9-262E-477A-AE8D-628B09D1E61E}" sibTransId="{FD336727-29B9-4CA0-9DE4-8982BF4489FA}"/>
     <dgm:cxn modelId="{62A80D99-C86E-4722-AB57-0A886555DEE4}" type="presOf" srcId="{F00BAD88-E21E-4F83-8D34-3AE7B7771110}" destId="{992EB662-2DC6-4067-B9B2-6A06B412FC64}" srcOrd="0" destOrd="0" presId="urn:microsoft.com/office/officeart/2008/layout/LinedList"/>
@@ -11585,19 +11598,19 @@
         <a:p>
           <a:r>
             <a:rPr lang="en-US" sz="900" i="1" dirty="0"/>
-            <a:t>Normal Quality – 1 charge, 2 charges on chest</a:t>
+            <a:t>Normal Quality – 0.25 charges, 0.5 charges on chest</a:t>
           </a:r>
         </a:p>
         <a:p>
           <a:r>
             <a:rPr lang="en-US" sz="900" i="1" dirty="0"/>
-            <a:t>Superior Quality – 2 charges, 4 charges on chest</a:t>
+            <a:t>Superior Quality – 0.5 charges, 1 charges on chest</a:t>
           </a:r>
         </a:p>
         <a:p>
           <a:r>
             <a:rPr lang="en-US" sz="900" i="1" dirty="0"/>
-            <a:t>Master Quality – 3 charges, 6 charges on chest</a:t>
+            <a:t>Master Quality – 1 charge, 2 charges on chest</a:t>
           </a:r>
         </a:p>
       </dgm:t>
@@ -11655,19 +11668,19 @@
         <a:p>
           <a:r>
             <a:rPr lang="en-US" sz="800" i="1" dirty="0"/>
-            <a:t>Normal Quality – 1 charge</a:t>
+            <a:t>Normal Quality – </a:t>
           </a:r>
         </a:p>
         <a:p>
           <a:r>
             <a:rPr lang="en-US" sz="800" i="1" dirty="0"/>
-            <a:t>Superior Quality – 2 charges, +1 stealth on chest (does not effect seek)</a:t>
+            <a:t>Superior Quality – +1 stealth on chest (does not effect seek)</a:t>
           </a:r>
         </a:p>
         <a:p>
           <a:r>
             <a:rPr lang="en-US" sz="800" i="1" dirty="0"/>
-            <a:t>Master Quality – 3 charges, +2 stealth on chest (does not effect seek)</a:t>
+            <a:t>Master Quality –  +2 stealth on chest (does not effect seek)</a:t>
           </a:r>
         </a:p>
         <a:p>
@@ -11734,19 +11747,19 @@
           </a:br>
           <a:r>
             <a:rPr lang="en-US" sz="800" i="1" dirty="0"/>
-            <a:t>Normal Quality – 1 charge</a:t>
+            <a:t>Normal Quality – </a:t>
           </a:r>
         </a:p>
         <a:p>
           <a:r>
             <a:rPr lang="en-US" sz="800" i="1" dirty="0"/>
-            <a:t>Superior Quality – 2 charges</a:t>
+            <a:t>Superior Quality – </a:t>
           </a:r>
         </a:p>
         <a:p>
           <a:r>
             <a:rPr lang="en-US" sz="800" i="1" dirty="0"/>
-            <a:t>Master Quality – 3 charges</a:t>
+            <a:t>Master Quality – </a:t>
           </a:r>
         </a:p>
         <a:p>
@@ -11828,19 +11841,19 @@
         <a:p>
           <a:r>
             <a:rPr lang="en-US" sz="800" i="1" dirty="0"/>
-            <a:t>Normal Quality – 1 charge</a:t>
+            <a:t>Normal Quality – </a:t>
           </a:r>
         </a:p>
         <a:p>
           <a:r>
             <a:rPr lang="en-US" sz="800" i="1" dirty="0"/>
-            <a:t>Superior Quality – 1 charge</a:t>
+            <a:t>Superior Quality – </a:t>
           </a:r>
         </a:p>
         <a:p>
           <a:r>
             <a:rPr lang="en-US" sz="800" i="1" dirty="0"/>
-            <a:t>Master Quality – 1 charge</a:t>
+            <a:t>Master Quality – </a:t>
           </a:r>
         </a:p>
       </dgm:t>
@@ -11996,9 +12009,9 @@
   </dgm:ptLst>
   <dgm:cxnLst>
     <dgm:cxn modelId="{7DFC8632-8134-4EF6-886C-41D8E5E4977C}" srcId="{AA555591-2097-494C-A41A-D12B96D9EB1F}" destId="{684A4583-4B24-4A57-9325-3735C4DEDE4F}" srcOrd="0" destOrd="0" parTransId="{6EA72475-67D1-479D-AC8C-BDA65C5D0806}" sibTransId="{8C9F8D0D-7658-4C54-8D07-59C5B9791BA6}"/>
+    <dgm:cxn modelId="{5C90E262-B161-4AB5-8F1D-9C3DB0F10E15}" type="presOf" srcId="{598A008A-3699-4D98-B094-4F46EADEFFF5}" destId="{657F7D3F-EDA2-4B65-8418-960F5E2F094C}" srcOrd="0" destOrd="0" presId="urn:microsoft.com/office/officeart/2008/layout/LinedList"/>
     <dgm:cxn modelId="{312D1046-0A5D-4F66-BD1E-4A3795C719F4}" type="presOf" srcId="{A8C48C25-53B2-4EEC-A275-96092AD63A8B}" destId="{DF4D4893-5F2F-4113-85DE-FAC0D730F58A}" srcOrd="0" destOrd="0" presId="urn:microsoft.com/office/officeart/2008/layout/LinedList"/>
     <dgm:cxn modelId="{46FB1353-2CDF-4169-AF40-DA8316193977}" srcId="{684A4583-4B24-4A57-9325-3735C4DEDE4F}" destId="{598A008A-3699-4D98-B094-4F46EADEFFF5}" srcOrd="0" destOrd="0" parTransId="{5B9899E8-7FC2-431C-96E0-8EF9F9607556}" sibTransId="{D3FA52B7-7AD1-4876-B6F0-82374149A222}"/>
-    <dgm:cxn modelId="{5C90E262-B161-4AB5-8F1D-9C3DB0F10E15}" type="presOf" srcId="{598A008A-3699-4D98-B094-4F46EADEFFF5}" destId="{657F7D3F-EDA2-4B65-8418-960F5E2F094C}" srcOrd="0" destOrd="0" presId="urn:microsoft.com/office/officeart/2008/layout/LinedList"/>
     <dgm:cxn modelId="{949BB37E-27A0-4006-841A-E894A1069973}" type="presOf" srcId="{3F352604-0826-4DCA-84B0-411D4D4063EF}" destId="{AEA8DBB6-9161-418E-A02D-061305FFAFE0}" srcOrd="0" destOrd="0" presId="urn:microsoft.com/office/officeart/2008/layout/LinedList"/>
     <dgm:cxn modelId="{38906C93-0B91-4640-91AC-1FF5B7069DBD}" srcId="{684A4583-4B24-4A57-9325-3735C4DEDE4F}" destId="{F00BAD88-E21E-4F83-8D34-3AE7B7771110}" srcOrd="2" destOrd="0" parTransId="{A7849EE9-262E-477A-AE8D-628B09D1E61E}" sibTransId="{FD336727-29B9-4CA0-9DE4-8982BF4489FA}"/>
     <dgm:cxn modelId="{BE3F6CD9-2396-46B4-9095-E8A660EAECA1}" type="presOf" srcId="{684A4583-4B24-4A57-9325-3735C4DEDE4F}" destId="{74A6C15A-A058-408E-AF34-284713A10187}" srcOrd="0" destOrd="0" presId="urn:microsoft.com/office/officeart/2008/layout/LinedList"/>
@@ -12527,10 +12540,10 @@
   <dgm:cxnLst>
     <dgm:cxn modelId="{4B27982C-15D8-43AE-94FD-54E2313B5D4F}" type="presOf" srcId="{F00BAD88-E21E-4F83-8D34-3AE7B7771110}" destId="{992EB662-2DC6-4067-B9B2-6A06B412FC64}" srcOrd="0" destOrd="0" presId="urn:microsoft.com/office/officeart/2008/layout/LinedList"/>
     <dgm:cxn modelId="{7DFC8632-8134-4EF6-886C-41D8E5E4977C}" srcId="{AA555591-2097-494C-A41A-D12B96D9EB1F}" destId="{684A4583-4B24-4A57-9325-3735C4DEDE4F}" srcOrd="0" destOrd="0" parTransId="{6EA72475-67D1-479D-AC8C-BDA65C5D0806}" sibTransId="{8C9F8D0D-7658-4C54-8D07-59C5B9791BA6}"/>
-    <dgm:cxn modelId="{46FB1353-2CDF-4169-AF40-DA8316193977}" srcId="{684A4583-4B24-4A57-9325-3735C4DEDE4F}" destId="{598A008A-3699-4D98-B094-4F46EADEFFF5}" srcOrd="0" destOrd="0" parTransId="{5B9899E8-7FC2-431C-96E0-8EF9F9607556}" sibTransId="{D3FA52B7-7AD1-4876-B6F0-82374149A222}"/>
     <dgm:cxn modelId="{6D8E455C-B2C4-4874-BA08-0C336B11C660}" type="presOf" srcId="{684A4583-4B24-4A57-9325-3735C4DEDE4F}" destId="{74A6C15A-A058-408E-AF34-284713A10187}" srcOrd="0" destOrd="0" presId="urn:microsoft.com/office/officeart/2008/layout/LinedList"/>
     <dgm:cxn modelId="{4D50E15E-D3E7-47EF-B0C0-9DDD8B9ECE74}" type="presOf" srcId="{AA555591-2097-494C-A41A-D12B96D9EB1F}" destId="{AB045FBD-BA05-4EA5-9D87-1E47CF76C7FE}" srcOrd="0" destOrd="0" presId="urn:microsoft.com/office/officeart/2008/layout/LinedList"/>
     <dgm:cxn modelId="{8FFAC16F-074B-4246-A3CB-44C76CA2845C}" type="presOf" srcId="{3F352604-0826-4DCA-84B0-411D4D4063EF}" destId="{AEA8DBB6-9161-418E-A02D-061305FFAFE0}" srcOrd="0" destOrd="0" presId="urn:microsoft.com/office/officeart/2008/layout/LinedList"/>
+    <dgm:cxn modelId="{46FB1353-2CDF-4169-AF40-DA8316193977}" srcId="{684A4583-4B24-4A57-9325-3735C4DEDE4F}" destId="{598A008A-3699-4D98-B094-4F46EADEFFF5}" srcOrd="0" destOrd="0" parTransId="{5B9899E8-7FC2-431C-96E0-8EF9F9607556}" sibTransId="{D3FA52B7-7AD1-4876-B6F0-82374149A222}"/>
     <dgm:cxn modelId="{9A950C89-D130-44B4-8839-58988A3ED1F9}" type="presOf" srcId="{A8C48C25-53B2-4EEC-A275-96092AD63A8B}" destId="{DF4D4893-5F2F-4113-85DE-FAC0D730F58A}" srcOrd="0" destOrd="0" presId="urn:microsoft.com/office/officeart/2008/layout/LinedList"/>
     <dgm:cxn modelId="{A863CC92-AE4C-4B60-91E2-4375C7AB9C63}" type="presOf" srcId="{598A008A-3699-4D98-B094-4F46EADEFFF5}" destId="{657F7D3F-EDA2-4B65-8418-960F5E2F094C}" srcOrd="0" destOrd="0" presId="urn:microsoft.com/office/officeart/2008/layout/LinedList"/>
     <dgm:cxn modelId="{38906C93-0B91-4640-91AC-1FF5B7069DBD}" srcId="{684A4583-4B24-4A57-9325-3735C4DEDE4F}" destId="{F00BAD88-E21E-4F83-8D34-3AE7B7771110}" srcOrd="2" destOrd="0" parTransId="{A7849EE9-262E-477A-AE8D-628B09D1E61E}" sibTransId="{FD336727-29B9-4CA0-9DE4-8982BF4489FA}"/>
@@ -13203,7 +13216,7 @@
           </a:pPr>
           <a:r>
             <a:rPr lang="en-US" sz="900" kern="1200" dirty="0"/>
-            <a:t>1.5 charges/level</a:t>
+            <a:t>1 charge/level</a:t>
           </a:r>
         </a:p>
         <a:p>
@@ -13349,7 +13362,7 @@
           </a:pPr>
           <a:r>
             <a:rPr lang="en-US" sz="900" kern="1200" dirty="0"/>
-            <a:t>2 charges/level</a:t>
+            <a:t>1 charge/level</a:t>
           </a:r>
         </a:p>
         <a:p>
@@ -13500,7 +13513,7 @@
           </a:pPr>
           <a:r>
             <a:rPr lang="en-US" sz="900" kern="1200" dirty="0"/>
-            <a:t>3 charges/level</a:t>
+            <a:t>1 charge/level</a:t>
           </a:r>
         </a:p>
         <a:p>
@@ -13646,7 +13659,7 @@
           </a:pPr>
           <a:r>
             <a:rPr lang="en-US" sz="900" kern="1200" dirty="0"/>
-            <a:t>2.5 charges/level</a:t>
+            <a:t>1 charge/level</a:t>
           </a:r>
         </a:p>
         <a:p>
@@ -16145,7 +16158,7 @@
                 <a:schemeClr val="bg1"/>
               </a:solidFill>
             </a:rPr>
-            <a:t>2 - +1 Health</a:t>
+            <a:t>2 - May use a Heavy Shield as if it were a Small Shield</a:t>
           </a:r>
         </a:p>
         <a:p>
@@ -16167,7 +16180,7 @@
                 <a:schemeClr val="bg1"/>
               </a:solidFill>
             </a:rPr>
-            <a:t>3 – May use a Heavy Shield as if it were a Small Shield</a:t>
+            <a:t>3 – +2 Health</a:t>
           </a:r>
           <a:br>
             <a:rPr lang="en-US" sz="900" kern="1200" dirty="0">
@@ -16840,8 +16853,35 @@
                 <a:schemeClr val="bg1"/>
               </a:solidFill>
             </a:rPr>
-            <a:t>2 - +.5 Charges/level</a:t>
+            <a:t>2 - Rejuvenation Potions no longer cause negative effects</a:t>
           </a:r>
+          <a:br>
+            <a:rPr lang="en-US" sz="900" kern="1200" dirty="0">
+              <a:solidFill>
+                <a:schemeClr val="bg1"/>
+              </a:solidFill>
+            </a:rPr>
+          </a:br>
+          <a:r>
+            <a:rPr lang="en-US" sz="900" kern="1200" dirty="0">
+              <a:solidFill>
+                <a:schemeClr val="bg1"/>
+              </a:solidFill>
+            </a:rPr>
+            <a:t>3 – +2 Charges</a:t>
+          </a:r>
+          <a:br>
+            <a:rPr lang="en-US" sz="900" kern="1200" dirty="0">
+              <a:solidFill>
+                <a:schemeClr val="bg1"/>
+              </a:solidFill>
+            </a:rPr>
+          </a:br>
+          <a:endParaRPr lang="en-US" sz="900" kern="1200" dirty="0">
+            <a:solidFill>
+              <a:schemeClr val="bg1"/>
+            </a:solidFill>
+          </a:endParaRPr>
         </a:p>
         <a:p>
           <a:pPr marL="57150" lvl="1" indent="-57150" algn="l" defTabSz="400050">
@@ -16854,30 +16894,8 @@
             <a:spcAft>
               <a:spcPct val="15000"/>
             </a:spcAft>
-            <a:buChar char="•"/>
+            <a:buNone/>
           </a:pPr>
-          <a:r>
-            <a:rPr lang="en-US" sz="900" kern="1200" dirty="0">
-              <a:solidFill>
-                <a:schemeClr val="bg1"/>
-              </a:solidFill>
-            </a:rPr>
-            <a:t>3 – Rejuvenation Potions no longer cause negative effects</a:t>
-          </a:r>
-          <a:br>
-            <a:rPr lang="en-US" sz="900" kern="1200" dirty="0">
-              <a:solidFill>
-                <a:schemeClr val="bg1"/>
-              </a:solidFill>
-            </a:rPr>
-          </a:br>
-          <a:br>
-            <a:rPr lang="en-US" sz="900" kern="1200" dirty="0">
-              <a:solidFill>
-                <a:schemeClr val="bg1"/>
-              </a:solidFill>
-            </a:rPr>
-          </a:br>
           <a:r>
             <a:rPr lang="en-US" sz="900" b="1" kern="1200" dirty="0">
               <a:solidFill>
@@ -16886,6 +16904,11 @@
             </a:rPr>
             <a:t>MIND OVER MATTER:</a:t>
           </a:r>
+          <a:endParaRPr lang="en-US" sz="900" kern="1200" dirty="0">
+            <a:solidFill>
+              <a:schemeClr val="bg1"/>
+            </a:solidFill>
+          </a:endParaRPr>
         </a:p>
         <a:p>
           <a:pPr marL="57150" lvl="1" indent="-57150" algn="l" defTabSz="400050">
@@ -18840,7 +18863,7 @@
           </a:pPr>
           <a:r>
             <a:rPr lang="en-US" sz="900" i="1" kern="1200" dirty="0"/>
-            <a:t>Normal Quality – 1 charge, 2 charges on chest</a:t>
+            <a:t>Normal Quality – 0.25 charges, 0.5 charges on chest</a:t>
           </a:r>
         </a:p>
         <a:p>
@@ -18858,7 +18881,7 @@
           </a:pPr>
           <a:r>
             <a:rPr lang="en-US" sz="900" i="1" kern="1200" dirty="0"/>
-            <a:t>Superior Quality – 2 charges, 4 charges on chest</a:t>
+            <a:t>Superior Quality – 0.5 charges, 1 charges on chest</a:t>
           </a:r>
         </a:p>
         <a:p>
@@ -18876,7 +18899,7 @@
           </a:pPr>
           <a:r>
             <a:rPr lang="en-US" sz="900" i="1" kern="1200" dirty="0"/>
-            <a:t>Master Quality – 3 charges, 6 charges on chest</a:t>
+            <a:t>Master Quality – 1 charge, 2 charges on chest</a:t>
           </a:r>
         </a:p>
       </dsp:txBody>
@@ -19055,7 +19078,7 @@
           </a:pPr>
           <a:r>
             <a:rPr lang="en-US" sz="800" i="1" kern="1200" dirty="0"/>
-            <a:t>Normal Quality – 1 charge</a:t>
+            <a:t>Normal Quality – </a:t>
           </a:r>
         </a:p>
         <a:p>
@@ -19073,7 +19096,7 @@
           </a:pPr>
           <a:r>
             <a:rPr lang="en-US" sz="800" i="1" kern="1200" dirty="0"/>
-            <a:t>Superior Quality – 2 charges, +1 stealth on chest (does not effect seek)</a:t>
+            <a:t>Superior Quality – +1 stealth on chest (does not effect seek)</a:t>
           </a:r>
         </a:p>
         <a:p>
@@ -19091,7 +19114,7 @@
           </a:pPr>
           <a:r>
             <a:rPr lang="en-US" sz="800" i="1" kern="1200" dirty="0"/>
-            <a:t>Master Quality – 3 charges, +2 stealth on chest (does not effect seek)</a:t>
+            <a:t>Master Quality –  +2 stealth on chest (does not effect seek)</a:t>
           </a:r>
         </a:p>
         <a:p>
@@ -19291,7 +19314,7 @@
           </a:br>
           <a:r>
             <a:rPr lang="en-US" sz="800" i="1" kern="1200" dirty="0"/>
-            <a:t>Normal Quality – 1 charge</a:t>
+            <a:t>Normal Quality – </a:t>
           </a:r>
         </a:p>
         <a:p>
@@ -19309,7 +19332,7 @@
           </a:pPr>
           <a:r>
             <a:rPr lang="en-US" sz="800" i="1" kern="1200" dirty="0"/>
-            <a:t>Superior Quality – 2 charges</a:t>
+            <a:t>Superior Quality – </a:t>
           </a:r>
         </a:p>
         <a:p>
@@ -19327,7 +19350,7 @@
           </a:pPr>
           <a:r>
             <a:rPr lang="en-US" sz="800" i="1" kern="1200" dirty="0"/>
-            <a:t>Master Quality – 3 charges</a:t>
+            <a:t>Master Quality – </a:t>
           </a:r>
         </a:p>
         <a:p>
@@ -19590,7 +19613,7 @@
           </a:pPr>
           <a:r>
             <a:rPr lang="en-US" sz="800" i="1" kern="1200" dirty="0"/>
-            <a:t>Normal Quality – 1 charge</a:t>
+            <a:t>Normal Quality – </a:t>
           </a:r>
         </a:p>
         <a:p>
@@ -19608,7 +19631,7 @@
           </a:pPr>
           <a:r>
             <a:rPr lang="en-US" sz="800" i="1" kern="1200" dirty="0"/>
-            <a:t>Superior Quality – 1 charge</a:t>
+            <a:t>Superior Quality – </a:t>
           </a:r>
         </a:p>
         <a:p>
@@ -19626,7 +19649,7 @@
           </a:pPr>
           <a:r>
             <a:rPr lang="en-US" sz="800" i="1" kern="1200" dirty="0"/>
-            <a:t>Master Quality – 1 charge</a:t>
+            <a:t>Master Quality – </a:t>
           </a:r>
         </a:p>
       </dsp:txBody>
@@ -32108,7 +32131,7 @@
           <a:p>
             <a:fld id="{C36CF053-3F3F-4498-B03F-79C95B346AA1}" type="datetimeFigureOut">
               <a:rPr lang="en-US" smtClean="0"/>
-              <a:t>7/16/20</a:t>
+              <a:t>7/19/2020</a:t>
             </a:fld>
             <a:endParaRPr lang="en-US"/>
           </a:p>
@@ -32607,7 +32630,7 @@
               <a:pPr>
                 <a:defRPr/>
               </a:pPr>
-              <a:t>7/16/20</a:t>
+              <a:t>7/19/2020</a:t>
             </a:fld>
             <a:endParaRPr lang="en-US"/>
           </a:p>
@@ -32802,7 +32825,7 @@
               <a:pPr>
                 <a:defRPr/>
               </a:pPr>
-              <a:t>7/16/20</a:t>
+              <a:t>7/19/2020</a:t>
             </a:fld>
             <a:endParaRPr lang="en-US"/>
           </a:p>
@@ -33007,7 +33030,7 @@
               <a:pPr>
                 <a:defRPr/>
               </a:pPr>
-              <a:t>7/16/20</a:t>
+              <a:t>7/19/2020</a:t>
             </a:fld>
             <a:endParaRPr lang="en-US"/>
           </a:p>
@@ -33221,7 +33244,7 @@
                 </a:solidFill>
               </a:rPr>
               <a:pPr/>
-              <a:t>7/16/20</a:t>
+              <a:t>7/19/2020</a:t>
             </a:fld>
             <a:endParaRPr lang="en-US">
               <a:solidFill>
@@ -33421,7 +33444,7 @@
                 </a:solidFill>
               </a:rPr>
               <a:pPr/>
-              <a:t>7/16/20</a:t>
+              <a:t>7/19/2020</a:t>
             </a:fld>
             <a:endParaRPr lang="en-US">
               <a:solidFill>
@@ -33698,7 +33721,7 @@
                 </a:solidFill>
               </a:rPr>
               <a:pPr/>
-              <a:t>7/16/20</a:t>
+              <a:t>7/19/2020</a:t>
             </a:fld>
             <a:endParaRPr lang="en-US">
               <a:solidFill>
@@ -33959,7 +33982,7 @@
                 </a:solidFill>
               </a:rPr>
               <a:pPr/>
-              <a:t>7/16/20</a:t>
+              <a:t>7/19/2020</a:t>
             </a:fld>
             <a:endParaRPr lang="en-US">
               <a:solidFill>
@@ -34355,7 +34378,7 @@
                 </a:solidFill>
               </a:rPr>
               <a:pPr/>
-              <a:t>7/16/20</a:t>
+              <a:t>7/19/2020</a:t>
             </a:fld>
             <a:endParaRPr lang="en-US">
               <a:solidFill>
@@ -34504,7 +34527,7 @@
                 </a:solidFill>
               </a:rPr>
               <a:pPr/>
-              <a:t>7/16/20</a:t>
+              <a:t>7/19/2020</a:t>
             </a:fld>
             <a:endParaRPr lang="en-US">
               <a:solidFill>
@@ -34631,7 +34654,7 @@
                 </a:solidFill>
               </a:rPr>
               <a:pPr/>
-              <a:t>7/16/20</a:t>
+              <a:t>7/19/2020</a:t>
             </a:fld>
             <a:endParaRPr lang="en-US">
               <a:solidFill>
@@ -34938,7 +34961,7 @@
                 </a:solidFill>
               </a:rPr>
               <a:pPr/>
-              <a:t>7/16/20</a:t>
+              <a:t>7/19/2020</a:t>
             </a:fld>
             <a:endParaRPr lang="en-US">
               <a:solidFill>
@@ -35141,7 +35164,7 @@
               <a:pPr>
                 <a:defRPr/>
               </a:pPr>
-              <a:t>7/16/20</a:t>
+              <a:t>7/19/2020</a:t>
             </a:fld>
             <a:endParaRPr lang="en-US"/>
           </a:p>
@@ -35417,7 +35440,7 @@
                 </a:solidFill>
               </a:rPr>
               <a:pPr/>
-              <a:t>7/16/20</a:t>
+              <a:t>7/19/2020</a:t>
             </a:fld>
             <a:endParaRPr lang="en-US">
               <a:solidFill>
@@ -35617,7 +35640,7 @@
                 </a:solidFill>
               </a:rPr>
               <a:pPr/>
-              <a:t>7/16/20</a:t>
+              <a:t>7/19/2020</a:t>
             </a:fld>
             <a:endParaRPr lang="en-US">
               <a:solidFill>
@@ -35827,7 +35850,7 @@
                 </a:solidFill>
               </a:rPr>
               <a:pPr/>
-              <a:t>7/16/20</a:t>
+              <a:t>7/19/2020</a:t>
             </a:fld>
             <a:endParaRPr lang="en-US">
               <a:solidFill>
@@ -36107,7 +36130,7 @@
               <a:pPr>
                 <a:defRPr/>
               </a:pPr>
-              <a:t>7/16/20</a:t>
+              <a:t>7/19/2020</a:t>
             </a:fld>
             <a:endParaRPr lang="en-US"/>
           </a:p>
@@ -36363,7 +36386,7 @@
               <a:pPr>
                 <a:defRPr/>
               </a:pPr>
-              <a:t>7/16/20</a:t>
+              <a:t>7/19/2020</a:t>
             </a:fld>
             <a:endParaRPr lang="en-US"/>
           </a:p>
@@ -36754,7 +36777,7 @@
               <a:pPr>
                 <a:defRPr/>
               </a:pPr>
-              <a:t>7/16/20</a:t>
+              <a:t>7/19/2020</a:t>
             </a:fld>
             <a:endParaRPr lang="en-US"/>
           </a:p>
@@ -36898,7 +36921,7 @@
               <a:pPr>
                 <a:defRPr/>
               </a:pPr>
-              <a:t>7/16/20</a:t>
+              <a:t>7/19/2020</a:t>
             </a:fld>
             <a:endParaRPr lang="en-US"/>
           </a:p>
@@ -37020,7 +37043,7 @@
               <a:pPr>
                 <a:defRPr/>
               </a:pPr>
-              <a:t>7/16/20</a:t>
+              <a:t>7/19/2020</a:t>
             </a:fld>
             <a:endParaRPr lang="en-US"/>
           </a:p>
@@ -37322,7 +37345,7 @@
               <a:pPr>
                 <a:defRPr/>
               </a:pPr>
-              <a:t>7/16/20</a:t>
+              <a:t>7/19/2020</a:t>
             </a:fld>
             <a:endParaRPr lang="en-US"/>
           </a:p>
@@ -37604,7 +37627,7 @@
               <a:pPr>
                 <a:defRPr/>
               </a:pPr>
-              <a:t>7/16/20</a:t>
+              <a:t>7/19/2020</a:t>
             </a:fld>
             <a:endParaRPr lang="en-US"/>
           </a:p>
@@ -37899,7 +37922,7 @@
               <a:pPr>
                 <a:defRPr/>
               </a:pPr>
-              <a:t>7/16/20</a:t>
+              <a:t>7/19/2020</a:t>
             </a:fld>
             <a:endParaRPr lang="en-US"/>
           </a:p>
@@ -38631,7 +38654,7 @@
                   <a:spcPts val="0"/>
                 </a:spcAft>
               </a:pPr>
-              <a:t>7/16/20</a:t>
+              <a:t>7/19/2020</a:t>
             </a:fld>
             <a:endParaRPr lang="en-US">
               <a:solidFill>
@@ -53103,7 +53126,7 @@
           <p:nvPr>
             <p:extLst>
               <p:ext uri="{D42A27DB-BD31-4B8C-83A1-F6EECF244321}">
-                <p14:modId xmlns:p14="http://schemas.microsoft.com/office/powerpoint/2010/main" val="1914518171"/>
+                <p14:modId xmlns:p14="http://schemas.microsoft.com/office/powerpoint/2010/main" val="3142968320"/>
               </p:ext>
             </p:extLst>
           </p:nvPr>
@@ -53474,7 +53497,7 @@
           <p:nvPr>
             <p:extLst>
               <p:ext uri="{D42A27DB-BD31-4B8C-83A1-F6EECF244321}">
-                <p14:modId xmlns:p14="http://schemas.microsoft.com/office/powerpoint/2010/main" val="860775021"/>
+                <p14:modId xmlns:p14="http://schemas.microsoft.com/office/powerpoint/2010/main" val="2814730486"/>
               </p:ext>
             </p:extLst>
           </p:nvPr>
@@ -54233,7 +54256,7 @@
           <p:nvPr>
             <p:extLst>
               <p:ext uri="{D42A27DB-BD31-4B8C-83A1-F6EECF244321}">
-                <p14:modId xmlns:p14="http://schemas.microsoft.com/office/powerpoint/2010/main" val="336800431"/>
+                <p14:modId xmlns:p14="http://schemas.microsoft.com/office/powerpoint/2010/main" val="3243021285"/>
               </p:ext>
             </p:extLst>
           </p:nvPr>

</xml_diff>